<commit_message>
Ejercicio Data Source Testing
</commit_message>
<xml_diff>
--- a/Diapositivas/0. Test Automation.pptx
+++ b/Diapositivas/0. Test Automation.pptx
@@ -5,7 +5,7 @@
     <p:sldMasterId id="2147483684" r:id="rId1"/>
   </p:sldMasterIdLst>
   <p:notesMasterIdLst>
-    <p:notesMasterId r:id="rId11"/>
+    <p:notesMasterId r:id="rId12"/>
   </p:notesMasterIdLst>
   <p:sldIdLst>
     <p:sldId id="609" r:id="rId2"/>
@@ -14,9 +14,10 @@
     <p:sldId id="660" r:id="rId5"/>
     <p:sldId id="610" r:id="rId6"/>
     <p:sldId id="571" r:id="rId7"/>
-    <p:sldId id="572" r:id="rId8"/>
+    <p:sldId id="661" r:id="rId8"/>
     <p:sldId id="567" r:id="rId9"/>
-    <p:sldId id="611" r:id="rId10"/>
+    <p:sldId id="572" r:id="rId10"/>
+    <p:sldId id="611" r:id="rId11"/>
   </p:sldIdLst>
   <p:sldSz cx="9144000" cy="6858000" type="screen4x3"/>
   <p:notesSz cx="6858000" cy="9144000"/>
@@ -216,7 +217,7 @@
           <a:p>
             <a:fld id="{63D5FC4C-9EE1-4746-A368-724F618FC790}" type="datetimeFigureOut">
               <a:rPr lang="es-PE" smtClean="0"/>
-              <a:t>19/04/2013</a:t>
+              <a:t>22/04/2013</a:t>
             </a:fld>
             <a:endParaRPr lang="es-PE"/>
           </a:p>
@@ -568,6 +569,90 @@
 </p:notes>
 </file>
 
+<file path=ppt/notesSlides/notesSlide10.xml><?xml version="1.0" encoding="utf-8"?>
+<p:notes xmlns:a="http://schemas.openxmlformats.org/drawingml/2006/main" xmlns:r="http://schemas.openxmlformats.org/officeDocument/2006/relationships" xmlns:p="http://schemas.openxmlformats.org/presentationml/2006/main">
+  <p:cSld>
+    <p:spTree>
+      <p:nvGrpSpPr>
+        <p:cNvPr id="1" name=""/>
+        <p:cNvGrpSpPr/>
+        <p:nvPr/>
+      </p:nvGrpSpPr>
+      <p:grpSpPr>
+        <a:xfrm>
+          <a:off x="0" y="0"/>
+          <a:ext cx="0" cy="0"/>
+          <a:chOff x="0" y="0"/>
+          <a:chExt cx="0" cy="0"/>
+        </a:xfrm>
+      </p:grpSpPr>
+      <p:sp>
+        <p:nvSpPr>
+          <p:cNvPr id="2" name="1 Marcador de imagen de diapositiva"/>
+          <p:cNvSpPr>
+            <a:spLocks noGrp="1" noRot="1" noChangeAspect="1"/>
+          </p:cNvSpPr>
+          <p:nvPr>
+            <p:ph type="sldImg"/>
+          </p:nvPr>
+        </p:nvSpPr>
+        <p:spPr/>
+      </p:sp>
+      <p:sp>
+        <p:nvSpPr>
+          <p:cNvPr id="3" name="2 Marcador de notas"/>
+          <p:cNvSpPr>
+            <a:spLocks noGrp="1"/>
+          </p:cNvSpPr>
+          <p:nvPr>
+            <p:ph type="body" idx="1"/>
+          </p:nvPr>
+        </p:nvSpPr>
+        <p:spPr/>
+        <p:txBody>
+          <a:bodyPr/>
+          <a:lstStyle/>
+          <a:p>
+            <a:endParaRPr lang="es-PE" dirty="0"/>
+          </a:p>
+        </p:txBody>
+      </p:sp>
+      <p:sp>
+        <p:nvSpPr>
+          <p:cNvPr id="4" name="3 Marcador de número de diapositiva"/>
+          <p:cNvSpPr>
+            <a:spLocks noGrp="1"/>
+          </p:cNvSpPr>
+          <p:nvPr>
+            <p:ph type="sldNum" sz="quarter" idx="10"/>
+          </p:nvPr>
+        </p:nvSpPr>
+        <p:spPr/>
+        <p:txBody>
+          <a:bodyPr/>
+          <a:lstStyle/>
+          <a:p>
+            <a:fld id="{80C14895-23C8-45AE-85D5-3B35E5980A68}" type="slidenum">
+              <a:rPr lang="es-PE" smtClean="0"/>
+              <a:t>10</a:t>
+            </a:fld>
+            <a:endParaRPr lang="es-PE"/>
+          </a:p>
+        </p:txBody>
+      </p:sp>
+    </p:spTree>
+    <p:extLst>
+      <p:ext uri="{BB962C8B-B14F-4D97-AF65-F5344CB8AC3E}">
+        <p14:creationId xmlns:p14="http://schemas.microsoft.com/office/powerpoint/2010/main" val="3432092158"/>
+      </p:ext>
+    </p:extLst>
+  </p:cSld>
+  <p:clrMapOvr>
+    <a:masterClrMapping/>
+  </p:clrMapOvr>
+</p:notes>
+</file>
+
 <file path=ppt/notesSlides/notesSlide2.xml><?xml version="1.0" encoding="utf-8"?>
 <p:notes xmlns:a="http://schemas.openxmlformats.org/drawingml/2006/main" xmlns:r="http://schemas.openxmlformats.org/officeDocument/2006/relationships" xmlns:p="http://schemas.openxmlformats.org/presentationml/2006/main">
   <p:cSld>
@@ -2101,75 +2186,68 @@
           <a:lstStyle/>
           <a:p>
             <a:r>
-              <a:rPr lang="es-PE" sz="1200" dirty="0" smtClean="0">
-                <a:solidFill>
-                  <a:schemeClr val="tx1">
-                    <a:lumMod val="95000"/>
-                  </a:schemeClr>
-                </a:solidFill>
+              <a:rPr lang="en-US" sz="1200" b="1" i="0" kern="1200" dirty="0" smtClean="0">
+                <a:solidFill>
+                  <a:schemeClr val="tx1"/>
+                </a:solidFill>
+                <a:effectLst/>
+                <a:latin typeface="+mn-lt"/>
+                <a:ea typeface="+mn-ea"/>
+                <a:cs typeface="+mn-cs"/>
               </a:rPr>
-              <a:t>Pruebas de Regresión.</a:t>
-            </a:r>
-          </a:p>
-          <a:p>
-            <a:r>
-              <a:rPr lang="es-PE" sz="1200" dirty="0" smtClean="0">
-                <a:solidFill>
-                  <a:schemeClr val="tx1">
-                    <a:lumMod val="95000"/>
-                  </a:schemeClr>
-                </a:solidFill>
+              <a:t>Relation Between Development and Testing Phases</a:t>
+            </a:r>
+          </a:p>
+          <a:p>
+            <a:endParaRPr lang="en-US" sz="1200" b="1" i="0" kern="1200" dirty="0" smtClean="0">
+              <a:solidFill>
+                <a:schemeClr val="tx1"/>
+              </a:solidFill>
+              <a:effectLst/>
+              <a:latin typeface="+mn-lt"/>
+              <a:ea typeface="+mn-ea"/>
+              <a:cs typeface="+mn-cs"/>
+            </a:endParaRPr>
+          </a:p>
+          <a:p>
+            <a:r>
+              <a:rPr lang="en-US" sz="1200" b="0" i="0" kern="1200" dirty="0" smtClean="0">
+                <a:solidFill>
+                  <a:schemeClr val="tx1"/>
+                </a:solidFill>
+                <a:effectLst/>
+                <a:latin typeface="+mn-lt"/>
+                <a:ea typeface="+mn-ea"/>
+                <a:cs typeface="+mn-cs"/>
               </a:rPr>
-              <a:t>Soporte a Refactoring.</a:t>
-            </a:r>
-          </a:p>
-          <a:p>
-            <a:r>
-              <a:rPr lang="es-PE" sz="1200" dirty="0" smtClean="0">
-                <a:solidFill>
-                  <a:schemeClr val="tx1">
-                    <a:lumMod val="95000"/>
-                  </a:schemeClr>
-                </a:solidFill>
+              <a:t>The V-Model demonstrates the relationships between each phase of the development life cycle and its associated phase of </a:t>
+            </a:r>
+            <a:r>
+              <a:rPr lang="en-US" sz="1200" b="0" i="0" u="none" strike="noStrike" kern="1200" dirty="0" smtClean="0">
+                <a:solidFill>
+                  <a:schemeClr val="tx1"/>
+                </a:solidFill>
+                <a:effectLst/>
+                <a:latin typeface="+mn-lt"/>
+                <a:ea typeface="+mn-ea"/>
+                <a:cs typeface="+mn-cs"/>
+                <a:hlinkClick r:id="rId3" tooltip="Software testing"/>
               </a:rPr>
-              <a:t>Calidad Interna.</a:t>
-            </a:r>
-          </a:p>
-          <a:p>
-            <a:r>
-              <a:rPr lang="es-PE" sz="1200" dirty="0" smtClean="0">
-                <a:solidFill>
-                  <a:schemeClr val="tx1">
-                    <a:lumMod val="95000"/>
-                  </a:schemeClr>
-                </a:solidFill>
+              <a:t>testing</a:t>
+            </a:r>
+            <a:r>
+              <a:rPr lang="en-US" sz="1200" b="0" i="0" kern="1200" dirty="0" smtClean="0">
+                <a:solidFill>
+                  <a:schemeClr val="tx1"/>
+                </a:solidFill>
+                <a:effectLst/>
+                <a:latin typeface="+mn-lt"/>
+                <a:ea typeface="+mn-ea"/>
+                <a:cs typeface="+mn-cs"/>
               </a:rPr>
-              <a:t>Hacer más en menos tiempo.</a:t>
-            </a:r>
-          </a:p>
-          <a:p>
-            <a:r>
-              <a:rPr lang="es-PE" sz="1200" dirty="0" smtClean="0">
-                <a:solidFill>
-                  <a:schemeClr val="tx1">
-                    <a:lumMod val="95000"/>
-                  </a:schemeClr>
-                </a:solidFill>
-              </a:rPr>
-              <a:t>Coraje.</a:t>
-            </a:r>
-          </a:p>
-          <a:p>
-            <a:pPr marL="0" indent="0" algn="ctr">
-              <a:buNone/>
-            </a:pPr>
-            <a:endParaRPr lang="es-PE" sz="1200" dirty="0" smtClean="0">
-              <a:solidFill>
-                <a:schemeClr val="tx1">
-                  <a:lumMod val="95000"/>
-                </a:schemeClr>
-              </a:solidFill>
-            </a:endParaRPr>
+              <a:t>. </a:t>
+            </a:r>
+            <a:endParaRPr lang="es-PE" dirty="0"/>
           </a:p>
         </p:txBody>
       </p:sp>
@@ -2424,7 +2502,76 @@
           <a:bodyPr/>
           <a:lstStyle/>
           <a:p>
-            <a:endParaRPr lang="es-PE" dirty="0"/>
+            <a:r>
+              <a:rPr lang="es-PE" sz="1200" dirty="0" smtClean="0">
+                <a:solidFill>
+                  <a:schemeClr val="tx1">
+                    <a:lumMod val="95000"/>
+                  </a:schemeClr>
+                </a:solidFill>
+              </a:rPr>
+              <a:t>Pruebas de Regresión.</a:t>
+            </a:r>
+          </a:p>
+          <a:p>
+            <a:r>
+              <a:rPr lang="es-PE" sz="1200" dirty="0" smtClean="0">
+                <a:solidFill>
+                  <a:schemeClr val="tx1">
+                    <a:lumMod val="95000"/>
+                  </a:schemeClr>
+                </a:solidFill>
+              </a:rPr>
+              <a:t>Soporte a Refactoring.</a:t>
+            </a:r>
+          </a:p>
+          <a:p>
+            <a:r>
+              <a:rPr lang="es-PE" sz="1200" dirty="0" smtClean="0">
+                <a:solidFill>
+                  <a:schemeClr val="tx1">
+                    <a:lumMod val="95000"/>
+                  </a:schemeClr>
+                </a:solidFill>
+              </a:rPr>
+              <a:t>Calidad Interna.</a:t>
+            </a:r>
+          </a:p>
+          <a:p>
+            <a:r>
+              <a:rPr lang="es-PE" sz="1200" dirty="0" smtClean="0">
+                <a:solidFill>
+                  <a:schemeClr val="tx1">
+                    <a:lumMod val="95000"/>
+                  </a:schemeClr>
+                </a:solidFill>
+              </a:rPr>
+              <a:t>Hacer más en menos tiempo.</a:t>
+            </a:r>
+          </a:p>
+          <a:p>
+            <a:r>
+              <a:rPr lang="es-PE" sz="1200" dirty="0" smtClean="0">
+                <a:solidFill>
+                  <a:schemeClr val="tx1">
+                    <a:lumMod val="95000"/>
+                  </a:schemeClr>
+                </a:solidFill>
+              </a:rPr>
+              <a:t>Coraje.</a:t>
+            </a:r>
+          </a:p>
+          <a:p>
+            <a:pPr marL="0" indent="0" algn="ctr">
+              <a:buNone/>
+            </a:pPr>
+            <a:endParaRPr lang="es-PE" sz="1200" dirty="0" smtClean="0">
+              <a:solidFill>
+                <a:schemeClr val="tx1">
+                  <a:lumMod val="95000"/>
+                </a:schemeClr>
+              </a:solidFill>
+            </a:endParaRPr>
           </a:p>
         </p:txBody>
       </p:sp>
@@ -2650,7 +2797,7 @@
             <a:fld id="{807CB568-C05F-482F-9F26-AA302B8892DF}" type="datetimeFigureOut">
               <a:rPr lang="es-ES" smtClean="0"/>
               <a:pPr/>
-              <a:t>19/04/2013</a:t>
+              <a:t>22/04/2013</a:t>
             </a:fld>
             <a:endParaRPr lang="es-ES"/>
           </a:p>
@@ -2829,7 +2976,7 @@
             <a:fld id="{807CB568-C05F-482F-9F26-AA302B8892DF}" type="datetimeFigureOut">
               <a:rPr lang="es-ES" smtClean="0"/>
               <a:pPr/>
-              <a:t>19/04/2013</a:t>
+              <a:t>22/04/2013</a:t>
             </a:fld>
             <a:endParaRPr lang="es-ES"/>
           </a:p>
@@ -3018,7 +3165,7 @@
             <a:fld id="{807CB568-C05F-482F-9F26-AA302B8892DF}" type="datetimeFigureOut">
               <a:rPr lang="es-ES" smtClean="0"/>
               <a:pPr/>
-              <a:t>19/04/2013</a:t>
+              <a:t>22/04/2013</a:t>
             </a:fld>
             <a:endParaRPr lang="es-ES"/>
           </a:p>
@@ -3197,7 +3344,7 @@
             <a:fld id="{807CB568-C05F-482F-9F26-AA302B8892DF}" type="datetimeFigureOut">
               <a:rPr lang="es-ES" smtClean="0"/>
               <a:pPr/>
-              <a:t>19/04/2013</a:t>
+              <a:t>22/04/2013</a:t>
             </a:fld>
             <a:endParaRPr lang="es-ES"/>
           </a:p>
@@ -3452,7 +3599,7 @@
             <a:fld id="{807CB568-C05F-482F-9F26-AA302B8892DF}" type="datetimeFigureOut">
               <a:rPr lang="es-ES" smtClean="0"/>
               <a:pPr/>
-              <a:t>19/04/2013</a:t>
+              <a:t>22/04/2013</a:t>
             </a:fld>
             <a:endParaRPr lang="es-ES"/>
           </a:p>
@@ -3749,7 +3896,7 @@
             <a:fld id="{807CB568-C05F-482F-9F26-AA302B8892DF}" type="datetimeFigureOut">
               <a:rPr lang="es-ES" smtClean="0"/>
               <a:pPr/>
-              <a:t>19/04/2013</a:t>
+              <a:t>22/04/2013</a:t>
             </a:fld>
             <a:endParaRPr lang="es-ES"/>
           </a:p>
@@ -4180,7 +4327,7 @@
             <a:fld id="{807CB568-C05F-482F-9F26-AA302B8892DF}" type="datetimeFigureOut">
               <a:rPr lang="es-ES" smtClean="0"/>
               <a:pPr/>
-              <a:t>19/04/2013</a:t>
+              <a:t>22/04/2013</a:t>
             </a:fld>
             <a:endParaRPr lang="es-ES"/>
           </a:p>
@@ -4307,7 +4454,7 @@
             <a:fld id="{807CB568-C05F-482F-9F26-AA302B8892DF}" type="datetimeFigureOut">
               <a:rPr lang="es-ES" smtClean="0"/>
               <a:pPr/>
-              <a:t>19/04/2013</a:t>
+              <a:t>22/04/2013</a:t>
             </a:fld>
             <a:endParaRPr lang="es-ES"/>
           </a:p>
@@ -4411,7 +4558,7 @@
             <a:fld id="{807CB568-C05F-482F-9F26-AA302B8892DF}" type="datetimeFigureOut">
               <a:rPr lang="es-ES" smtClean="0"/>
               <a:pPr/>
-              <a:t>19/04/2013</a:t>
+              <a:t>22/04/2013</a:t>
             </a:fld>
             <a:endParaRPr lang="es-ES"/>
           </a:p>
@@ -4697,7 +4844,7 @@
             <a:fld id="{807CB568-C05F-482F-9F26-AA302B8892DF}" type="datetimeFigureOut">
               <a:rPr lang="es-ES" smtClean="0"/>
               <a:pPr/>
-              <a:t>19/04/2013</a:t>
+              <a:t>22/04/2013</a:t>
             </a:fld>
             <a:endParaRPr lang="es-ES"/>
           </a:p>
@@ -4966,7 +5113,7 @@
             <a:fld id="{807CB568-C05F-482F-9F26-AA302B8892DF}" type="datetimeFigureOut">
               <a:rPr lang="es-ES" smtClean="0"/>
               <a:pPr/>
-              <a:t>19/04/2013</a:t>
+              <a:t>22/04/2013</a:t>
             </a:fld>
             <a:endParaRPr lang="es-ES"/>
           </a:p>
@@ -5217,7 +5364,7 @@
             <a:fld id="{807CB568-C05F-482F-9F26-AA302B8892DF}" type="datetimeFigureOut">
               <a:rPr lang="es-ES" smtClean="0"/>
               <a:pPr/>
-              <a:t>19/04/2013</a:t>
+              <a:t>22/04/2013</a:t>
             </a:fld>
             <a:endParaRPr lang="es-ES"/>
           </a:p>
@@ -6030,6 +6177,183 @@
 </p:sld>
 </file>
 
+<file path=ppt/slides/slide10.xml><?xml version="1.0" encoding="utf-8"?>
+<p:sld xmlns:a="http://schemas.openxmlformats.org/drawingml/2006/main" xmlns:r="http://schemas.openxmlformats.org/officeDocument/2006/relationships" xmlns:p="http://schemas.openxmlformats.org/presentationml/2006/main">
+  <p:cSld>
+    <p:spTree>
+      <p:nvGrpSpPr>
+        <p:cNvPr id="1" name=""/>
+        <p:cNvGrpSpPr/>
+        <p:nvPr/>
+      </p:nvGrpSpPr>
+      <p:grpSpPr>
+        <a:xfrm>
+          <a:off x="0" y="0"/>
+          <a:ext cx="0" cy="0"/>
+          <a:chOff x="0" y="0"/>
+          <a:chExt cx="0" cy="0"/>
+        </a:xfrm>
+      </p:grpSpPr>
+      <p:sp>
+        <p:nvSpPr>
+          <p:cNvPr id="3" name="2 Título"/>
+          <p:cNvSpPr>
+            <a:spLocks noGrp="1"/>
+          </p:cNvSpPr>
+          <p:nvPr>
+            <p:ph type="title"/>
+          </p:nvPr>
+        </p:nvSpPr>
+        <p:spPr>
+          <a:xfrm>
+            <a:off x="524338" y="216030"/>
+            <a:ext cx="8229600" cy="724942"/>
+          </a:xfrm>
+        </p:spPr>
+        <p:txBody>
+          <a:bodyPr/>
+          <a:lstStyle/>
+          <a:p>
+            <a:r>
+              <a:rPr lang="es-PE" dirty="0" smtClean="0">
+                <a:solidFill>
+                  <a:srgbClr val="00823B"/>
+                </a:solidFill>
+              </a:rPr>
+              <a:t>Información Adicional</a:t>
+            </a:r>
+            <a:endParaRPr lang="es-PE" dirty="0">
+              <a:solidFill>
+                <a:srgbClr val="00823B"/>
+              </a:solidFill>
+            </a:endParaRPr>
+          </a:p>
+        </p:txBody>
+      </p:sp>
+      <p:sp>
+        <p:nvSpPr>
+          <p:cNvPr id="13" name="12 CuadroTexto"/>
+          <p:cNvSpPr txBox="1"/>
+          <p:nvPr/>
+        </p:nvSpPr>
+        <p:spPr>
+          <a:xfrm>
+            <a:off x="209672" y="1124744"/>
+            <a:ext cx="8712968" cy="1938992"/>
+          </a:xfrm>
+          <a:prstGeom prst="rect">
+            <a:avLst/>
+          </a:prstGeom>
+          <a:noFill/>
+        </p:spPr>
+        <p:txBody>
+          <a:bodyPr wrap="square" rtlCol="0">
+            <a:spAutoFit/>
+          </a:bodyPr>
+          <a:lstStyle/>
+          <a:p>
+            <a:pPr marL="457200" indent="-457200">
+              <a:buFont typeface="Arial" pitchFamily="34" charset="0"/>
+              <a:buChar char="•"/>
+            </a:pPr>
+            <a:r>
+              <a:rPr lang="es-PE" sz="2400" dirty="0" smtClean="0"/>
+              <a:t>Manual </a:t>
+            </a:r>
+            <a:r>
+              <a:rPr lang="es-PE" sz="2400" dirty="0" err="1" smtClean="0"/>
+              <a:t>tests</a:t>
+            </a:r>
+            <a:r>
+              <a:rPr lang="es-PE" sz="2400" dirty="0" smtClean="0"/>
+              <a:t> are </a:t>
+            </a:r>
+            <a:r>
+              <a:rPr lang="es-PE" sz="2400" dirty="0" err="1" smtClean="0"/>
+              <a:t>Important</a:t>
+            </a:r>
+            <a:r>
+              <a:rPr lang="es-PE" sz="2400" dirty="0" smtClean="0"/>
+              <a:t/>
+            </a:r>
+            <a:br>
+              <a:rPr lang="es-PE" sz="2400" dirty="0" smtClean="0"/>
+            </a:br>
+            <a:r>
+              <a:rPr lang="es-PE" sz="2400" dirty="0">
+                <a:solidFill>
+                  <a:srgbClr val="FFC000"/>
+                </a:solidFill>
+              </a:rPr>
+              <a:t>http://www.satisfice.com/blog/archives/58</a:t>
+            </a:r>
+          </a:p>
+          <a:p>
+            <a:pPr marL="457200" indent="-457200">
+              <a:buFont typeface="Arial" pitchFamily="34" charset="0"/>
+              <a:buChar char="•"/>
+            </a:pPr>
+            <a:endParaRPr lang="es-PE" sz="2400" dirty="0" smtClean="0"/>
+          </a:p>
+          <a:p>
+            <a:pPr marL="457200" indent="-457200">
+              <a:buFont typeface="Arial" pitchFamily="34" charset="0"/>
+              <a:buChar char="•"/>
+            </a:pPr>
+            <a:r>
+              <a:rPr lang="es-PE" sz="2400" dirty="0" smtClean="0"/>
+              <a:t>Agile </a:t>
+            </a:r>
+            <a:r>
+              <a:rPr lang="es-PE" sz="2400" dirty="0" err="1" smtClean="0"/>
+              <a:t>Testing</a:t>
+            </a:r>
+            <a:r>
+              <a:rPr lang="es-PE" sz="2400" dirty="0" smtClean="0"/>
+              <a:t> </a:t>
+            </a:r>
+            <a:r>
+              <a:rPr lang="es-PE" sz="2400" dirty="0" err="1" smtClean="0"/>
+              <a:t>Matrix</a:t>
+            </a:r>
+            <a:r>
+              <a:rPr lang="es-PE" sz="2400" dirty="0" smtClean="0"/>
+              <a:t/>
+            </a:r>
+            <a:br>
+              <a:rPr lang="es-PE" sz="2400" dirty="0" smtClean="0"/>
+            </a:br>
+            <a:r>
+              <a:rPr lang="es-PE" sz="2400" dirty="0">
+                <a:solidFill>
+                  <a:srgbClr val="FFC000"/>
+                </a:solidFill>
+              </a:rPr>
+              <a:t>http://www.exampler.com/old-blog/2003/08/21/</a:t>
+            </a:r>
+          </a:p>
+        </p:txBody>
+      </p:sp>
+    </p:spTree>
+    <p:extLst>
+      <p:ext uri="{BB962C8B-B14F-4D97-AF65-F5344CB8AC3E}">
+        <p14:creationId xmlns:p14="http://schemas.microsoft.com/office/powerpoint/2010/main" val="1813450959"/>
+      </p:ext>
+    </p:extLst>
+  </p:cSld>
+  <p:clrMapOvr>
+    <a:masterClrMapping/>
+  </p:clrMapOvr>
+  <p:timing>
+    <p:tnLst>
+      <p:par>
+        <p:cTn id="1" dur="indefinite" restart="never" nodeType="tmRoot"/>
+      </p:par>
+    </p:tnLst>
+  </p:timing>
+</p:sld>
+</file>
+
 <file path=ppt/slides/slide2.xml><?xml version="1.0" encoding="utf-8"?>
 <p:sld xmlns:a="http://schemas.openxmlformats.org/drawingml/2006/main" xmlns:r="http://schemas.openxmlformats.org/officeDocument/2006/relationships" xmlns:p="http://schemas.openxmlformats.org/presentationml/2006/main">
   <p:cSld>
@@ -6103,14 +6427,14 @@
             <a:r>
               <a:rPr lang="en-US" sz="11500" b="1" dirty="0" smtClean="0">
                 <a:solidFill>
-                  <a:srgbClr val="FF0000"/>
+                  <a:schemeClr val="tx2"/>
                 </a:solidFill>
               </a:rPr>
               <a:t>Automation</a:t>
             </a:r>
             <a:endParaRPr lang="en-US" sz="7200" b="1" dirty="0">
               <a:solidFill>
-                <a:srgbClr val="FF0000"/>
+                <a:schemeClr val="tx2"/>
               </a:solidFill>
             </a:endParaRPr>
           </a:p>
@@ -7953,7 +8277,7 @@
                   <a:srgbClr val="00823B"/>
                 </a:solidFill>
               </a:rPr>
-              <a:t>Diferentes Tipos de </a:t>
+              <a:t>Agile </a:t>
             </a:r>
             <a:r>
               <a:rPr lang="es-PE" dirty="0" err="1" smtClean="0">
@@ -7961,7 +8285,23 @@
                   <a:srgbClr val="00823B"/>
                 </a:solidFill>
               </a:rPr>
-              <a:t>Tests</a:t>
+              <a:t>Testing</a:t>
+            </a:r>
+            <a:r>
+              <a:rPr lang="es-PE" dirty="0" smtClean="0">
+                <a:solidFill>
+                  <a:srgbClr val="00823B"/>
+                </a:solidFill>
+              </a:rPr>
+              <a:t> </a:t>
+            </a:r>
+            <a:r>
+              <a:rPr lang="es-PE" dirty="0" err="1" smtClean="0">
+                <a:solidFill>
+                  <a:srgbClr val="00823B"/>
+                </a:solidFill>
+              </a:rPr>
+              <a:t>Quadrant</a:t>
             </a:r>
             <a:endParaRPr lang="es-PE" dirty="0">
               <a:solidFill>
@@ -9463,7 +9803,7 @@
         </p:nvSpPr>
         <p:spPr>
           <a:xfrm>
-            <a:off x="529208" y="476672"/>
+            <a:off x="529208" y="188640"/>
             <a:ext cx="8229600" cy="864096"/>
           </a:xfrm>
         </p:spPr>
@@ -9477,239 +9817,596 @@
                   <a:srgbClr val="00823B"/>
                 </a:solidFill>
               </a:rPr>
-              <a:t>Beneficios del 1er Cuadrante</a:t>
-            </a:r>
-            <a:br>
-              <a:rPr lang="es-PE" dirty="0" smtClean="0">
+              <a:t>V-</a:t>
+            </a:r>
+            <a:r>
+              <a:rPr lang="es-PE" dirty="0" err="1" smtClean="0">
                 <a:solidFill>
                   <a:srgbClr val="00823B"/>
                 </a:solidFill>
               </a:rPr>
-            </a:br>
-            <a:r>
-              <a:rPr lang="es-PE" dirty="0">
-                <a:solidFill>
-                  <a:srgbClr val="00823B"/>
-                </a:solidFill>
-              </a:rPr>
-              <a:t>(</a:t>
-            </a:r>
-            <a:r>
-              <a:rPr lang="es-PE" dirty="0" err="1">
-                <a:solidFill>
-                  <a:srgbClr val="00823B"/>
-                </a:solidFill>
-              </a:rPr>
-              <a:t>Unit</a:t>
-            </a:r>
-            <a:r>
-              <a:rPr lang="es-PE" dirty="0">
-                <a:solidFill>
-                  <a:srgbClr val="00823B"/>
-                </a:solidFill>
-              </a:rPr>
-              <a:t>, Integration y </a:t>
-            </a:r>
-            <a:r>
-              <a:rPr lang="es-PE" dirty="0" err="1">
-                <a:solidFill>
-                  <a:srgbClr val="00823B"/>
-                </a:solidFill>
-              </a:rPr>
-              <a:t>System</a:t>
-            </a:r>
-            <a:r>
-              <a:rPr lang="es-PE" dirty="0">
-                <a:solidFill>
-                  <a:srgbClr val="00823B"/>
-                </a:solidFill>
-              </a:rPr>
-              <a:t> </a:t>
-            </a:r>
-            <a:r>
-              <a:rPr lang="es-PE" dirty="0" err="1">
-                <a:solidFill>
-                  <a:srgbClr val="00823B"/>
-                </a:solidFill>
-              </a:rPr>
-              <a:t>Tests</a:t>
-            </a:r>
-            <a:r>
-              <a:rPr lang="es-PE" dirty="0">
-                <a:solidFill>
-                  <a:srgbClr val="00823B"/>
-                </a:solidFill>
-              </a:rPr>
-              <a:t>)</a:t>
-            </a:r>
+              <a:t>Model</a:t>
+            </a:r>
+            <a:endParaRPr lang="es-PE" dirty="0">
+              <a:solidFill>
+                <a:srgbClr val="00823B"/>
+              </a:solidFill>
+            </a:endParaRPr>
           </a:p>
         </p:txBody>
       </p:sp>
-      <p:sp>
-        <p:nvSpPr>
-          <p:cNvPr id="5" name="2 Marcador de contenido"/>
-          <p:cNvSpPr>
-            <a:spLocks noGrp="1"/>
-          </p:cNvSpPr>
-          <p:nvPr>
-            <p:ph idx="1"/>
-          </p:nvPr>
-        </p:nvSpPr>
-        <p:spPr>
+      <p:grpSp>
+        <p:nvGrpSpPr>
+          <p:cNvPr id="15" name="14 Grupo"/>
+          <p:cNvGrpSpPr/>
+          <p:nvPr/>
+        </p:nvGrpSpPr>
+        <p:grpSpPr>
           <a:xfrm>
-            <a:off x="194502" y="2032248"/>
-            <a:ext cx="8820472" cy="2908920"/>
+            <a:off x="935744" y="1744403"/>
+            <a:ext cx="7272512" cy="3529687"/>
+            <a:chOff x="1035913" y="1744403"/>
+            <a:chExt cx="7272512" cy="3529687"/>
           </a:xfrm>
-        </p:spPr>
-        <p:txBody>
-          <a:bodyPr/>
-          <a:lstStyle/>
-          <a:p>
-            <a:pPr marL="0" indent="0" algn="ctr">
-              <a:buNone/>
-            </a:pPr>
-            <a:r>
-              <a:rPr lang="es-PE" sz="2800" dirty="0">
-                <a:solidFill>
-                  <a:schemeClr val="tx1">
-                    <a:lumMod val="95000"/>
-                  </a:schemeClr>
-                </a:solidFill>
-                <a:latin typeface="Calibri" pitchFamily="34" charset="0"/>
-              </a:rPr>
-              <a:t>Proporcionan una capa de seguridad para </a:t>
-            </a:r>
-            <a:r>
-              <a:rPr lang="es-PE" sz="2800" dirty="0" smtClean="0">
-                <a:solidFill>
-                  <a:schemeClr val="tx1">
-                    <a:lumMod val="95000"/>
-                  </a:schemeClr>
-                </a:solidFill>
-                <a:latin typeface="Calibri" pitchFamily="34" charset="0"/>
-              </a:rPr>
-              <a:t/>
-            </a:r>
-            <a:br>
-              <a:rPr lang="es-PE" sz="2800" dirty="0" smtClean="0">
-                <a:solidFill>
-                  <a:schemeClr val="tx1">
-                    <a:lumMod val="95000"/>
-                  </a:schemeClr>
-                </a:solidFill>
-                <a:latin typeface="Calibri" pitchFamily="34" charset="0"/>
-              </a:rPr>
-            </a:br>
-            <a:r>
-              <a:rPr lang="es-PE" sz="2800" b="1" dirty="0" smtClean="0">
-                <a:solidFill>
-                  <a:srgbClr val="FFC000"/>
-                </a:solidFill>
-                <a:latin typeface="Calibri" pitchFamily="34" charset="0"/>
-              </a:rPr>
-              <a:t>agregar </a:t>
-            </a:r>
-            <a:r>
-              <a:rPr lang="es-PE" sz="2800" b="1" dirty="0">
-                <a:solidFill>
-                  <a:srgbClr val="FFC000"/>
-                </a:solidFill>
-                <a:latin typeface="Calibri" pitchFamily="34" charset="0"/>
-              </a:rPr>
-              <a:t>o modificar características </a:t>
-            </a:r>
-            <a:r>
-              <a:rPr lang="es-PE" sz="2800" b="1" dirty="0" smtClean="0">
-                <a:solidFill>
-                  <a:srgbClr val="FFC000"/>
-                </a:solidFill>
-                <a:latin typeface="Calibri" pitchFamily="34" charset="0"/>
-              </a:rPr>
-              <a:t>a la </a:t>
-            </a:r>
-            <a:r>
-              <a:rPr lang="es-PE" sz="2800" b="1" dirty="0">
-                <a:solidFill>
-                  <a:srgbClr val="FFC000"/>
-                </a:solidFill>
-                <a:latin typeface="Calibri" pitchFamily="34" charset="0"/>
-              </a:rPr>
-              <a:t>aplicación de manera </a:t>
-            </a:r>
-            <a:r>
-              <a:rPr lang="es-PE" sz="2800" b="1" dirty="0" smtClean="0">
-                <a:solidFill>
-                  <a:srgbClr val="FFC000"/>
-                </a:solidFill>
-                <a:latin typeface="Calibri" pitchFamily="34" charset="0"/>
-              </a:rPr>
-              <a:t>segura.</a:t>
-            </a:r>
-          </a:p>
-          <a:p>
-            <a:pPr marL="0" indent="0" algn="ctr">
-              <a:buNone/>
-            </a:pPr>
-            <a:endParaRPr lang="es-PE" sz="2600" dirty="0" smtClean="0">
+        </p:grpSpPr>
+        <p:sp>
+          <p:nvSpPr>
+            <p:cNvPr id="2" name="1 Rectángulo redondeado"/>
+            <p:cNvSpPr/>
+            <p:nvPr/>
+          </p:nvSpPr>
+          <p:spPr>
+            <a:xfrm>
+              <a:off x="2585655" y="4300939"/>
+              <a:ext cx="1931532" cy="864096"/>
+            </a:xfrm>
+            <a:prstGeom prst="roundRect">
+              <a:avLst/>
+            </a:prstGeom>
+          </p:spPr>
+          <p:style>
+            <a:lnRef idx="2">
+              <a:schemeClr val="accent1">
+                <a:shade val="50000"/>
+              </a:schemeClr>
+            </a:lnRef>
+            <a:fillRef idx="1">
+              <a:schemeClr val="accent1"/>
+            </a:fillRef>
+            <a:effectRef idx="0">
+              <a:schemeClr val="accent1"/>
+            </a:effectRef>
+            <a:fontRef idx="minor">
+              <a:schemeClr val="lt1"/>
+            </a:fontRef>
+          </p:style>
+          <p:txBody>
+            <a:bodyPr rtlCol="0" anchor="ctr"/>
+            <a:lstStyle/>
+            <a:p>
+              <a:pPr algn="ctr"/>
+              <a:r>
+                <a:rPr lang="es-PE" dirty="0" err="1" smtClean="0"/>
+                <a:t>Coding</a:t>
+              </a:r>
+              <a:endParaRPr lang="es-PE" dirty="0"/>
+            </a:p>
+          </p:txBody>
+        </p:sp>
+        <p:sp>
+          <p:nvSpPr>
+            <p:cNvPr id="21" name="20 Rectángulo redondeado"/>
+            <p:cNvSpPr/>
+            <p:nvPr/>
+          </p:nvSpPr>
+          <p:spPr>
+            <a:xfrm>
+              <a:off x="4872716" y="4300939"/>
+              <a:ext cx="1931532" cy="864096"/>
+            </a:xfrm>
+            <a:prstGeom prst="roundRect">
+              <a:avLst/>
+            </a:prstGeom>
+          </p:spPr>
+          <p:style>
+            <a:lnRef idx="2">
+              <a:schemeClr val="accent2">
+                <a:shade val="50000"/>
+              </a:schemeClr>
+            </a:lnRef>
+            <a:fillRef idx="1">
+              <a:schemeClr val="accent2"/>
+            </a:fillRef>
+            <a:effectRef idx="0">
+              <a:schemeClr val="accent2"/>
+            </a:effectRef>
+            <a:fontRef idx="minor">
+              <a:schemeClr val="lt1"/>
+            </a:fontRef>
+          </p:style>
+          <p:txBody>
+            <a:bodyPr rtlCol="0" anchor="ctr"/>
+            <a:lstStyle/>
+            <a:p>
+              <a:pPr algn="ctr"/>
+              <a:r>
+                <a:rPr lang="es-PE" dirty="0" err="1" smtClean="0"/>
+                <a:t>Unit</a:t>
+              </a:r>
+              <a:r>
+                <a:rPr lang="es-PE" dirty="0" smtClean="0"/>
+                <a:t> </a:t>
+              </a:r>
+              <a:br>
+                <a:rPr lang="es-PE" dirty="0" smtClean="0"/>
+              </a:br>
+              <a:r>
+                <a:rPr lang="es-PE" dirty="0" err="1" smtClean="0"/>
+                <a:t>Testing</a:t>
+              </a:r>
+              <a:endParaRPr lang="es-PE" dirty="0"/>
+            </a:p>
+          </p:txBody>
+        </p:sp>
+        <p:sp>
+          <p:nvSpPr>
+            <p:cNvPr id="22" name="21 Rectángulo redondeado"/>
+            <p:cNvSpPr/>
+            <p:nvPr/>
+          </p:nvSpPr>
+          <p:spPr>
+            <a:xfrm>
+              <a:off x="5453789" y="3054282"/>
+              <a:ext cx="1926523" cy="1008112"/>
+            </a:xfrm>
+            <a:prstGeom prst="roundRect">
+              <a:avLst/>
+            </a:prstGeom>
+          </p:spPr>
+          <p:style>
+            <a:lnRef idx="2">
+              <a:schemeClr val="accent2">
+                <a:shade val="50000"/>
+              </a:schemeClr>
+            </a:lnRef>
+            <a:fillRef idx="1">
+              <a:schemeClr val="accent2"/>
+            </a:fillRef>
+            <a:effectRef idx="0">
+              <a:schemeClr val="accent2"/>
+            </a:effectRef>
+            <a:fontRef idx="minor">
+              <a:schemeClr val="lt1"/>
+            </a:fontRef>
+          </p:style>
+          <p:txBody>
+            <a:bodyPr rtlCol="0" anchor="ctr"/>
+            <a:lstStyle/>
+            <a:p>
+              <a:pPr algn="ctr"/>
+              <a:r>
+                <a:rPr lang="es-PE" dirty="0" smtClean="0"/>
+                <a:t>Integration </a:t>
+              </a:r>
+              <a:r>
+                <a:rPr lang="es-PE" dirty="0" err="1" smtClean="0"/>
+                <a:t>Testing</a:t>
+              </a:r>
+              <a:endParaRPr lang="es-PE" dirty="0"/>
+            </a:p>
+          </p:txBody>
+        </p:sp>
+        <p:sp>
+          <p:nvSpPr>
+            <p:cNvPr id="40" name="39 Rectángulo redondeado"/>
+            <p:cNvSpPr/>
+            <p:nvPr/>
+          </p:nvSpPr>
+          <p:spPr>
+            <a:xfrm>
+              <a:off x="1979712" y="3054282"/>
+              <a:ext cx="1926523" cy="1008112"/>
+            </a:xfrm>
+            <a:prstGeom prst="roundRect">
+              <a:avLst/>
+            </a:prstGeom>
+          </p:spPr>
+          <p:style>
+            <a:lnRef idx="2">
+              <a:schemeClr val="accent1">
+                <a:shade val="50000"/>
+              </a:schemeClr>
+            </a:lnRef>
+            <a:fillRef idx="1">
+              <a:schemeClr val="accent1"/>
+            </a:fillRef>
+            <a:effectRef idx="0">
+              <a:schemeClr val="accent1"/>
+            </a:effectRef>
+            <a:fontRef idx="minor">
+              <a:schemeClr val="lt1"/>
+            </a:fontRef>
+          </p:style>
+          <p:txBody>
+            <a:bodyPr rtlCol="0" anchor="ctr"/>
+            <a:lstStyle/>
+            <a:p>
+              <a:pPr algn="ctr"/>
+              <a:r>
+                <a:rPr lang="es-PE" dirty="0" err="1" smtClean="0"/>
+                <a:t>Design</a:t>
+              </a:r>
+              <a:r>
+                <a:rPr lang="es-PE" dirty="0" smtClean="0"/>
+                <a:t/>
+              </a:r>
+              <a:br>
+                <a:rPr lang="es-PE" dirty="0" smtClean="0"/>
+              </a:br>
+              <a:r>
+                <a:rPr lang="es-PE" dirty="0" smtClean="0"/>
+                <a:t>(</a:t>
+              </a:r>
+              <a:r>
+                <a:rPr lang="es-PE" dirty="0" err="1" smtClean="0"/>
+                <a:t>Architectural</a:t>
+              </a:r>
+              <a:r>
+                <a:rPr lang="es-PE" dirty="0" smtClean="0"/>
+                <a:t>, </a:t>
+              </a:r>
+              <a:r>
+                <a:rPr lang="es-PE" dirty="0" err="1" smtClean="0"/>
+                <a:t>Component</a:t>
+              </a:r>
+              <a:r>
+                <a:rPr lang="es-PE" dirty="0" smtClean="0"/>
+                <a:t>)</a:t>
+              </a:r>
+              <a:endParaRPr lang="es-PE" dirty="0"/>
+            </a:p>
+          </p:txBody>
+        </p:sp>
+        <p:sp>
+          <p:nvSpPr>
+            <p:cNvPr id="41" name="40 Rectángulo redondeado"/>
+            <p:cNvSpPr/>
+            <p:nvPr/>
+          </p:nvSpPr>
+          <p:spPr>
+            <a:xfrm>
+              <a:off x="1475656" y="1817173"/>
+              <a:ext cx="1926523" cy="1012567"/>
+            </a:xfrm>
+            <a:prstGeom prst="roundRect">
+              <a:avLst/>
+            </a:prstGeom>
+          </p:spPr>
+          <p:style>
+            <a:lnRef idx="2">
+              <a:schemeClr val="accent1">
+                <a:shade val="50000"/>
+              </a:schemeClr>
+            </a:lnRef>
+            <a:fillRef idx="1">
+              <a:schemeClr val="accent1"/>
+            </a:fillRef>
+            <a:effectRef idx="0">
+              <a:schemeClr val="accent1"/>
+            </a:effectRef>
+            <a:fontRef idx="minor">
+              <a:schemeClr val="lt1"/>
+            </a:fontRef>
+          </p:style>
+          <p:txBody>
+            <a:bodyPr rtlCol="0" anchor="ctr"/>
+            <a:lstStyle/>
+            <a:p>
+              <a:pPr algn="ctr"/>
+              <a:r>
+                <a:rPr lang="es-PE" dirty="0" smtClean="0"/>
+                <a:t>Análisis</a:t>
+              </a:r>
+              <a:br>
+                <a:rPr lang="es-PE" dirty="0" smtClean="0"/>
+              </a:br>
+              <a:r>
+                <a:rPr lang="es-PE" dirty="0" smtClean="0"/>
+                <a:t>(</a:t>
+              </a:r>
+              <a:r>
+                <a:rPr lang="es-PE" dirty="0" err="1" smtClean="0"/>
+                <a:t>Funct</a:t>
+              </a:r>
+              <a:r>
+                <a:rPr lang="es-PE" dirty="0" smtClean="0"/>
+                <a:t>/Non </a:t>
+              </a:r>
+              <a:r>
+                <a:rPr lang="es-PE" dirty="0" err="1" smtClean="0"/>
+                <a:t>Funct</a:t>
+              </a:r>
+              <a:r>
+                <a:rPr lang="es-PE" dirty="0" smtClean="0"/>
+                <a:t> </a:t>
+              </a:r>
+              <a:r>
+                <a:rPr lang="es-PE" dirty="0" err="1" smtClean="0"/>
+                <a:t>Requirements</a:t>
+              </a:r>
+              <a:r>
+                <a:rPr lang="es-PE" dirty="0" smtClean="0"/>
+                <a:t>)</a:t>
+              </a:r>
+              <a:endParaRPr lang="es-PE" dirty="0"/>
+            </a:p>
+          </p:txBody>
+        </p:sp>
+        <p:sp>
+          <p:nvSpPr>
+            <p:cNvPr id="42" name="41 Rectángulo redondeado"/>
+            <p:cNvSpPr/>
+            <p:nvPr/>
+          </p:nvSpPr>
+          <p:spPr>
+            <a:xfrm>
+              <a:off x="5957845" y="1817173"/>
+              <a:ext cx="1926523" cy="1012567"/>
+            </a:xfrm>
+            <a:prstGeom prst="roundRect">
+              <a:avLst/>
+            </a:prstGeom>
+          </p:spPr>
+          <p:style>
+            <a:lnRef idx="2">
+              <a:schemeClr val="accent2">
+                <a:shade val="50000"/>
+              </a:schemeClr>
+            </a:lnRef>
+            <a:fillRef idx="1">
+              <a:schemeClr val="accent2"/>
+            </a:fillRef>
+            <a:effectRef idx="0">
+              <a:schemeClr val="accent2"/>
+            </a:effectRef>
+            <a:fontRef idx="minor">
+              <a:schemeClr val="lt1"/>
+            </a:fontRef>
+          </p:style>
+          <p:txBody>
+            <a:bodyPr rtlCol="0" anchor="ctr"/>
+            <a:lstStyle/>
+            <a:p>
+              <a:pPr algn="ctr"/>
+              <a:r>
+                <a:rPr lang="es-PE" dirty="0" err="1" smtClean="0"/>
+                <a:t>System</a:t>
+              </a:r>
+              <a:r>
+                <a:rPr lang="es-PE" dirty="0" smtClean="0"/>
+                <a:t> </a:t>
+              </a:r>
+              <a:br>
+                <a:rPr lang="es-PE" dirty="0" smtClean="0"/>
+              </a:br>
+              <a:r>
+                <a:rPr lang="es-PE" dirty="0" err="1" smtClean="0"/>
+                <a:t>Testing</a:t>
+              </a:r>
+              <a:endParaRPr lang="es-PE" dirty="0"/>
+            </a:p>
+          </p:txBody>
+        </p:sp>
+        <p:sp>
+          <p:nvSpPr>
+            <p:cNvPr id="3" name="2 Flecha derecha"/>
+            <p:cNvSpPr/>
+            <p:nvPr/>
+          </p:nvSpPr>
+          <p:spPr>
+            <a:xfrm rot="4037035">
+              <a:off x="-404087" y="3186090"/>
+              <a:ext cx="3528000" cy="648000"/>
+            </a:xfrm>
+            <a:prstGeom prst="rightArrow">
+              <a:avLst/>
+            </a:prstGeom>
+          </p:spPr>
+          <p:style>
+            <a:lnRef idx="2">
+              <a:schemeClr val="accent3">
+                <a:shade val="50000"/>
+              </a:schemeClr>
+            </a:lnRef>
+            <a:fillRef idx="1">
+              <a:schemeClr val="accent3"/>
+            </a:fillRef>
+            <a:effectRef idx="0">
+              <a:schemeClr val="accent3"/>
+            </a:effectRef>
+            <a:fontRef idx="minor">
+              <a:schemeClr val="lt1"/>
+            </a:fontRef>
+          </p:style>
+          <p:txBody>
+            <a:bodyPr rtlCol="0" anchor="ctr"/>
+            <a:lstStyle/>
+            <a:p>
+              <a:pPr algn="ctr"/>
+              <a:r>
+                <a:rPr lang="es-PE" sz="2000" dirty="0" smtClean="0"/>
+                <a:t>Proceso de Desarrollo</a:t>
+              </a:r>
+              <a:endParaRPr lang="es-PE" sz="2000" dirty="0"/>
+            </a:p>
+          </p:txBody>
+        </p:sp>
+        <p:sp>
+          <p:nvSpPr>
+            <p:cNvPr id="44" name="43 Flecha izquierda"/>
+            <p:cNvSpPr/>
+            <p:nvPr/>
+          </p:nvSpPr>
+          <p:spPr>
+            <a:xfrm rot="17562965" flipH="1">
+              <a:off x="6220425" y="3184403"/>
+              <a:ext cx="3528000" cy="648000"/>
+            </a:xfrm>
+            <a:prstGeom prst="leftArrow">
+              <a:avLst/>
+            </a:prstGeom>
+          </p:spPr>
+          <p:style>
+            <a:lnRef idx="2">
+              <a:schemeClr val="accent3">
+                <a:shade val="50000"/>
+              </a:schemeClr>
+            </a:lnRef>
+            <a:fillRef idx="1">
+              <a:schemeClr val="accent3"/>
+            </a:fillRef>
+            <a:effectRef idx="0">
+              <a:schemeClr val="accent3"/>
+            </a:effectRef>
+            <a:fontRef idx="minor">
+              <a:schemeClr val="lt1"/>
+            </a:fontRef>
+          </p:style>
+          <p:txBody>
+            <a:bodyPr rtlCol="0" anchor="ctr"/>
+            <a:lstStyle/>
+            <a:p>
+              <a:pPr algn="ctr"/>
+              <a:r>
+                <a:rPr lang="es-PE" sz="2000" dirty="0" smtClean="0"/>
+                <a:t>Proceso de Pruebas</a:t>
+              </a:r>
+              <a:endParaRPr lang="es-PE" sz="2000" dirty="0"/>
+            </a:p>
+          </p:txBody>
+        </p:sp>
+        <p:cxnSp>
+          <p:nvCxnSpPr>
+            <p:cNvPr id="5" name="4 Conector recto de flecha"/>
+            <p:cNvCxnSpPr>
+              <a:stCxn id="42" idx="1"/>
+              <a:endCxn id="41" idx="3"/>
+            </p:cNvCxnSpPr>
+            <p:nvPr/>
+          </p:nvCxnSpPr>
+          <p:spPr>
+            <a:xfrm flipH="1">
+              <a:off x="3402179" y="2323457"/>
+              <a:ext cx="2555666" cy="0"/>
+            </a:xfrm>
+            <a:prstGeom prst="straightConnector1">
+              <a:avLst/>
+            </a:prstGeom>
+            <a:ln w="38100">
               <a:solidFill>
-                <a:schemeClr val="tx1">
-                  <a:lumMod val="95000"/>
-                </a:schemeClr>
+                <a:srgbClr val="FFC000"/>
               </a:solidFill>
-              <a:latin typeface="Calibri" pitchFamily="34" charset="0"/>
-            </a:endParaRPr>
-          </a:p>
-          <a:p>
-            <a:r>
-              <a:rPr lang="es-PE" sz="2600" dirty="0">
-                <a:solidFill>
-                  <a:schemeClr val="tx1">
-                    <a:lumMod val="95000"/>
-                  </a:schemeClr>
-                </a:solidFill>
-                <a:latin typeface="Calibri" pitchFamily="34" charset="0"/>
-              </a:rPr>
-              <a:t>Hacer más en menos tiempo (Pruebas de Regresión).</a:t>
-            </a:r>
-          </a:p>
-          <a:p>
-            <a:r>
-              <a:rPr lang="es-PE" sz="2600" dirty="0">
-                <a:solidFill>
-                  <a:schemeClr val="tx1">
-                    <a:lumMod val="95000"/>
-                  </a:schemeClr>
-                </a:solidFill>
-                <a:latin typeface="Calibri" pitchFamily="34" charset="0"/>
-              </a:rPr>
-              <a:t>Calidad Interna (Habilita el Refactoring</a:t>
-            </a:r>
-            <a:r>
-              <a:rPr lang="es-PE" sz="2600" dirty="0" smtClean="0">
-                <a:solidFill>
-                  <a:schemeClr val="tx1">
-                    <a:lumMod val="95000"/>
-                  </a:schemeClr>
-                </a:solidFill>
-                <a:latin typeface="Calibri" pitchFamily="34" charset="0"/>
-              </a:rPr>
-              <a:t>).</a:t>
-            </a:r>
-            <a:endParaRPr lang="es-PE" sz="2600" dirty="0">
+              <a:tailEnd type="arrow"/>
+            </a:ln>
+          </p:spPr>
+          <p:style>
+            <a:lnRef idx="3">
+              <a:schemeClr val="accent6"/>
+            </a:lnRef>
+            <a:fillRef idx="0">
+              <a:schemeClr val="accent6"/>
+            </a:fillRef>
+            <a:effectRef idx="2">
+              <a:schemeClr val="accent6"/>
+            </a:effectRef>
+            <a:fontRef idx="minor">
+              <a:schemeClr val="tx1"/>
+            </a:fontRef>
+          </p:style>
+        </p:cxnSp>
+        <p:cxnSp>
+          <p:nvCxnSpPr>
+            <p:cNvPr id="45" name="44 Conector recto de flecha"/>
+            <p:cNvCxnSpPr>
+              <a:stCxn id="22" idx="1"/>
+              <a:endCxn id="40" idx="3"/>
+            </p:cNvCxnSpPr>
+            <p:nvPr/>
+          </p:nvCxnSpPr>
+          <p:spPr>
+            <a:xfrm flipH="1">
+              <a:off x="3906235" y="3558338"/>
+              <a:ext cx="1547554" cy="0"/>
+            </a:xfrm>
+            <a:prstGeom prst="straightConnector1">
+              <a:avLst/>
+            </a:prstGeom>
+            <a:ln w="38100">
               <a:solidFill>
-                <a:schemeClr val="tx1">
-                  <a:lumMod val="95000"/>
-                </a:schemeClr>
+                <a:srgbClr val="FFC000"/>
               </a:solidFill>
-              <a:latin typeface="Calibri" pitchFamily="34" charset="0"/>
-            </a:endParaRPr>
-          </a:p>
-        </p:txBody>
-      </p:sp>
+              <a:tailEnd type="arrow"/>
+            </a:ln>
+          </p:spPr>
+          <p:style>
+            <a:lnRef idx="3">
+              <a:schemeClr val="accent6"/>
+            </a:lnRef>
+            <a:fillRef idx="0">
+              <a:schemeClr val="accent6"/>
+            </a:fillRef>
+            <a:effectRef idx="2">
+              <a:schemeClr val="accent6"/>
+            </a:effectRef>
+            <a:fontRef idx="minor">
+              <a:schemeClr val="tx1"/>
+            </a:fontRef>
+          </p:style>
+        </p:cxnSp>
+        <p:cxnSp>
+          <p:nvCxnSpPr>
+            <p:cNvPr id="46" name="45 Conector recto de flecha"/>
+            <p:cNvCxnSpPr>
+              <a:stCxn id="21" idx="1"/>
+              <a:endCxn id="2" idx="3"/>
+            </p:cNvCxnSpPr>
+            <p:nvPr/>
+          </p:nvCxnSpPr>
+          <p:spPr>
+            <a:xfrm flipH="1">
+              <a:off x="4517187" y="4732987"/>
+              <a:ext cx="355529" cy="0"/>
+            </a:xfrm>
+            <a:prstGeom prst="straightConnector1">
+              <a:avLst/>
+            </a:prstGeom>
+            <a:ln w="38100">
+              <a:solidFill>
+                <a:srgbClr val="FFC000"/>
+              </a:solidFill>
+              <a:tailEnd type="arrow"/>
+            </a:ln>
+          </p:spPr>
+          <p:style>
+            <a:lnRef idx="3">
+              <a:schemeClr val="accent6"/>
+            </a:lnRef>
+            <a:fillRef idx="0">
+              <a:schemeClr val="accent6"/>
+            </a:fillRef>
+            <a:effectRef idx="2">
+              <a:schemeClr val="accent6"/>
+            </a:effectRef>
+            <a:fontRef idx="minor">
+              <a:schemeClr val="tx1"/>
+            </a:fontRef>
+          </p:style>
+        </p:cxnSp>
+      </p:grpSp>
     </p:spTree>
     <p:extLst>
       <p:ext uri="{BB962C8B-B14F-4D97-AF65-F5344CB8AC3E}">
-        <p14:creationId xmlns:p14="http://schemas.microsoft.com/office/powerpoint/2010/main" val="1748465625"/>
+        <p14:creationId xmlns:p14="http://schemas.microsoft.com/office/powerpoint/2010/main" val="1467851799"/>
       </p:ext>
     </p:extLst>
   </p:cSld>
@@ -10486,7 +11183,7 @@
       </p:grpSpPr>
       <p:sp>
         <p:nvSpPr>
-          <p:cNvPr id="3" name="2 Título"/>
+          <p:cNvPr id="13" name="2 Título"/>
           <p:cNvSpPr>
             <a:spLocks noGrp="1"/>
           </p:cNvSpPr>
@@ -10496,8 +11193,8 @@
         </p:nvSpPr>
         <p:spPr>
           <a:xfrm>
-            <a:off x="524338" y="216030"/>
-            <a:ext cx="8229600" cy="724942"/>
+            <a:off x="529208" y="476672"/>
+            <a:ext cx="8229600" cy="864096"/>
           </a:xfrm>
         </p:spPr>
         <p:txBody>
@@ -10510,124 +11207,239 @@
                   <a:srgbClr val="00823B"/>
                 </a:solidFill>
               </a:rPr>
-              <a:t>Información Adicional</a:t>
-            </a:r>
-            <a:endParaRPr lang="es-PE" dirty="0">
-              <a:solidFill>
-                <a:srgbClr val="00823B"/>
-              </a:solidFill>
-            </a:endParaRPr>
+              <a:t>Beneficios del 1er Cuadrante</a:t>
+            </a:r>
+            <a:br>
+              <a:rPr lang="es-PE" dirty="0" smtClean="0">
+                <a:solidFill>
+                  <a:srgbClr val="00823B"/>
+                </a:solidFill>
+              </a:rPr>
+            </a:br>
+            <a:r>
+              <a:rPr lang="es-PE" dirty="0">
+                <a:solidFill>
+                  <a:srgbClr val="00823B"/>
+                </a:solidFill>
+              </a:rPr>
+              <a:t>(</a:t>
+            </a:r>
+            <a:r>
+              <a:rPr lang="es-PE" dirty="0" err="1">
+                <a:solidFill>
+                  <a:srgbClr val="00823B"/>
+                </a:solidFill>
+              </a:rPr>
+              <a:t>Unit</a:t>
+            </a:r>
+            <a:r>
+              <a:rPr lang="es-PE" dirty="0">
+                <a:solidFill>
+                  <a:srgbClr val="00823B"/>
+                </a:solidFill>
+              </a:rPr>
+              <a:t>, Integration y </a:t>
+            </a:r>
+            <a:r>
+              <a:rPr lang="es-PE" dirty="0" err="1">
+                <a:solidFill>
+                  <a:srgbClr val="00823B"/>
+                </a:solidFill>
+              </a:rPr>
+              <a:t>System</a:t>
+            </a:r>
+            <a:r>
+              <a:rPr lang="es-PE" dirty="0">
+                <a:solidFill>
+                  <a:srgbClr val="00823B"/>
+                </a:solidFill>
+              </a:rPr>
+              <a:t> </a:t>
+            </a:r>
+            <a:r>
+              <a:rPr lang="es-PE" dirty="0" err="1">
+                <a:solidFill>
+                  <a:srgbClr val="00823B"/>
+                </a:solidFill>
+              </a:rPr>
+              <a:t>Tests</a:t>
+            </a:r>
+            <a:r>
+              <a:rPr lang="es-PE" dirty="0">
+                <a:solidFill>
+                  <a:srgbClr val="00823B"/>
+                </a:solidFill>
+              </a:rPr>
+              <a:t>)</a:t>
+            </a:r>
           </a:p>
         </p:txBody>
       </p:sp>
       <p:sp>
         <p:nvSpPr>
-          <p:cNvPr id="13" name="12 CuadroTexto"/>
-          <p:cNvSpPr txBox="1"/>
-          <p:nvPr/>
+          <p:cNvPr id="5" name="2 Marcador de contenido"/>
+          <p:cNvSpPr>
+            <a:spLocks noGrp="1"/>
+          </p:cNvSpPr>
+          <p:nvPr>
+            <p:ph idx="1"/>
+          </p:nvPr>
         </p:nvSpPr>
         <p:spPr>
           <a:xfrm>
-            <a:off x="209672" y="1124744"/>
-            <a:ext cx="8712968" cy="1938992"/>
+            <a:off x="194502" y="2032248"/>
+            <a:ext cx="8820472" cy="2908920"/>
           </a:xfrm>
-          <a:prstGeom prst="rect">
-            <a:avLst/>
-          </a:prstGeom>
-          <a:noFill/>
         </p:spPr>
         <p:txBody>
-          <a:bodyPr wrap="square" rtlCol="0">
-            <a:spAutoFit/>
-          </a:bodyPr>
+          <a:bodyPr/>
           <a:lstStyle/>
           <a:p>
-            <a:pPr marL="457200" indent="-457200">
-              <a:buFont typeface="Arial" pitchFamily="34" charset="0"/>
-              <a:buChar char="•"/>
+            <a:pPr marL="0" indent="0" algn="ctr">
+              <a:buNone/>
             </a:pPr>
             <a:r>
-              <a:rPr lang="es-PE" sz="2400" dirty="0" smtClean="0"/>
-              <a:t>Manual </a:t>
-            </a:r>
-            <a:r>
-              <a:rPr lang="es-PE" sz="2400" dirty="0" err="1" smtClean="0"/>
-              <a:t>tests</a:t>
-            </a:r>
-            <a:r>
-              <a:rPr lang="es-PE" sz="2400" dirty="0" smtClean="0"/>
-              <a:t> are </a:t>
-            </a:r>
-            <a:r>
-              <a:rPr lang="es-PE" sz="2400" dirty="0" err="1" smtClean="0"/>
-              <a:t>Important</a:t>
-            </a:r>
-            <a:r>
-              <a:rPr lang="es-PE" sz="2400" dirty="0" smtClean="0"/>
+              <a:rPr lang="es-PE" sz="2800" dirty="0">
+                <a:solidFill>
+                  <a:schemeClr val="tx1">
+                    <a:lumMod val="95000"/>
+                  </a:schemeClr>
+                </a:solidFill>
+                <a:latin typeface="Calibri" pitchFamily="34" charset="0"/>
+              </a:rPr>
+              <a:t>Proporcionan una capa de seguridad para </a:t>
+            </a:r>
+            <a:r>
+              <a:rPr lang="es-PE" sz="2800" dirty="0" smtClean="0">
+                <a:solidFill>
+                  <a:schemeClr val="tx1">
+                    <a:lumMod val="95000"/>
+                  </a:schemeClr>
+                </a:solidFill>
+                <a:latin typeface="Calibri" pitchFamily="34" charset="0"/>
+              </a:rPr>
               <a:t/>
             </a:r>
             <a:br>
-              <a:rPr lang="es-PE" sz="2400" dirty="0" smtClean="0"/>
+              <a:rPr lang="es-PE" sz="2800" dirty="0" smtClean="0">
+                <a:solidFill>
+                  <a:schemeClr val="tx1">
+                    <a:lumMod val="95000"/>
+                  </a:schemeClr>
+                </a:solidFill>
+                <a:latin typeface="Calibri" pitchFamily="34" charset="0"/>
+              </a:rPr>
             </a:br>
             <a:r>
-              <a:rPr lang="es-PE" sz="2400" dirty="0">
+              <a:rPr lang="es-PE" sz="2800" b="1" dirty="0" smtClean="0">
                 <a:solidFill>
                   <a:srgbClr val="FFC000"/>
                 </a:solidFill>
+                <a:latin typeface="Calibri" pitchFamily="34" charset="0"/>
               </a:rPr>
-              <a:t>http://www.satisfice.com/blog/archives/58</a:t>
-            </a:r>
-          </a:p>
-          <a:p>
-            <a:pPr marL="457200" indent="-457200">
-              <a:buFont typeface="Arial" pitchFamily="34" charset="0"/>
-              <a:buChar char="•"/>
+              <a:t>agregar </a:t>
+            </a:r>
+            <a:r>
+              <a:rPr lang="es-PE" sz="2800" b="1" dirty="0">
+                <a:solidFill>
+                  <a:srgbClr val="FFC000"/>
+                </a:solidFill>
+                <a:latin typeface="Calibri" pitchFamily="34" charset="0"/>
+              </a:rPr>
+              <a:t>o modificar características </a:t>
+            </a:r>
+            <a:r>
+              <a:rPr lang="es-PE" sz="2800" b="1" dirty="0" smtClean="0">
+                <a:solidFill>
+                  <a:srgbClr val="FFC000"/>
+                </a:solidFill>
+                <a:latin typeface="Calibri" pitchFamily="34" charset="0"/>
+              </a:rPr>
+              <a:t>a la </a:t>
+            </a:r>
+            <a:r>
+              <a:rPr lang="es-PE" sz="2800" b="1" dirty="0">
+                <a:solidFill>
+                  <a:srgbClr val="FFC000"/>
+                </a:solidFill>
+                <a:latin typeface="Calibri" pitchFamily="34" charset="0"/>
+              </a:rPr>
+              <a:t>aplicación de manera </a:t>
+            </a:r>
+            <a:r>
+              <a:rPr lang="es-PE" sz="2800" b="1" dirty="0" smtClean="0">
+                <a:solidFill>
+                  <a:srgbClr val="FFC000"/>
+                </a:solidFill>
+                <a:latin typeface="Calibri" pitchFamily="34" charset="0"/>
+              </a:rPr>
+              <a:t>segura.</a:t>
+            </a:r>
+          </a:p>
+          <a:p>
+            <a:pPr marL="0" indent="0" algn="ctr">
+              <a:buNone/>
             </a:pPr>
-            <a:endParaRPr lang="es-PE" sz="2400" dirty="0" smtClean="0"/>
-          </a:p>
-          <a:p>
-            <a:pPr marL="457200" indent="-457200">
-              <a:buFont typeface="Arial" pitchFamily="34" charset="0"/>
-              <a:buChar char="•"/>
-            </a:pPr>
-            <a:r>
-              <a:rPr lang="es-PE" sz="2400" dirty="0" smtClean="0"/>
-              <a:t>Agile </a:t>
-            </a:r>
-            <a:r>
-              <a:rPr lang="es-PE" sz="2400" dirty="0" err="1" smtClean="0"/>
-              <a:t>Testing</a:t>
-            </a:r>
-            <a:r>
-              <a:rPr lang="es-PE" sz="2400" dirty="0" smtClean="0"/>
-              <a:t> </a:t>
-            </a:r>
-            <a:r>
-              <a:rPr lang="es-PE" sz="2400" dirty="0" err="1" smtClean="0"/>
-              <a:t>Matrix</a:t>
-            </a:r>
-            <a:r>
-              <a:rPr lang="es-PE" sz="2400" dirty="0" smtClean="0"/>
-              <a:t/>
-            </a:r>
-            <a:br>
-              <a:rPr lang="es-PE" sz="2400" dirty="0" smtClean="0"/>
-            </a:br>
-            <a:r>
-              <a:rPr lang="es-PE" sz="2400" dirty="0">
-                <a:solidFill>
-                  <a:srgbClr val="FFC000"/>
-                </a:solidFill>
+            <a:endParaRPr lang="es-PE" sz="2600" dirty="0" smtClean="0">
+              <a:solidFill>
+                <a:schemeClr val="tx1">
+                  <a:lumMod val="95000"/>
+                </a:schemeClr>
+              </a:solidFill>
+              <a:latin typeface="Calibri" pitchFamily="34" charset="0"/>
+            </a:endParaRPr>
+          </a:p>
+          <a:p>
+            <a:r>
+              <a:rPr lang="es-PE" sz="2600" dirty="0">
+                <a:solidFill>
+                  <a:schemeClr val="tx1">
+                    <a:lumMod val="95000"/>
+                  </a:schemeClr>
+                </a:solidFill>
+                <a:latin typeface="Calibri" pitchFamily="34" charset="0"/>
               </a:rPr>
-              <a:t>http://www.exampler.com/old-blog/2003/08/21/</a:t>
-            </a:r>
+              <a:t>Hacer más en menos tiempo (Pruebas de Regresión).</a:t>
+            </a:r>
+          </a:p>
+          <a:p>
+            <a:r>
+              <a:rPr lang="es-PE" sz="2600" dirty="0">
+                <a:solidFill>
+                  <a:schemeClr val="tx1">
+                    <a:lumMod val="95000"/>
+                  </a:schemeClr>
+                </a:solidFill>
+                <a:latin typeface="Calibri" pitchFamily="34" charset="0"/>
+              </a:rPr>
+              <a:t>Calidad Interna (Habilita el Refactoring</a:t>
+            </a:r>
+            <a:r>
+              <a:rPr lang="es-PE" sz="2600" dirty="0" smtClean="0">
+                <a:solidFill>
+                  <a:schemeClr val="tx1">
+                    <a:lumMod val="95000"/>
+                  </a:schemeClr>
+                </a:solidFill>
+                <a:latin typeface="Calibri" pitchFamily="34" charset="0"/>
+              </a:rPr>
+              <a:t>).</a:t>
+            </a:r>
+            <a:endParaRPr lang="es-PE" sz="2600" dirty="0">
+              <a:solidFill>
+                <a:schemeClr val="tx1">
+                  <a:lumMod val="95000"/>
+                </a:schemeClr>
+              </a:solidFill>
+              <a:latin typeface="Calibri" pitchFamily="34" charset="0"/>
+            </a:endParaRPr>
           </a:p>
         </p:txBody>
       </p:sp>
     </p:spTree>
     <p:extLst>
       <p:ext uri="{BB962C8B-B14F-4D97-AF65-F5344CB8AC3E}">
-        <p14:creationId xmlns:p14="http://schemas.microsoft.com/office/powerpoint/2010/main" val="1813450959"/>
+        <p14:creationId xmlns:p14="http://schemas.microsoft.com/office/powerpoint/2010/main" val="1748465625"/>
       </p:ext>
     </p:extLst>
   </p:cSld>

</xml_diff>

<commit_message>
Ejercicios Test Doubles y Concept Reviews
</commit_message>
<xml_diff>
--- a/Diapositivas/0. Test Automation.pptx
+++ b/Diapositivas/0. Test Automation.pptx
@@ -217,7 +217,7 @@
           <a:p>
             <a:fld id="{63D5FC4C-9EE1-4746-A368-724F618FC790}" type="datetimeFigureOut">
               <a:rPr lang="es-PE" smtClean="0"/>
-              <a:t>22/04/2013</a:t>
+              <a:t>23/04/2013</a:t>
             </a:fld>
             <a:endParaRPr lang="es-PE"/>
           </a:p>
@@ -2797,7 +2797,7 @@
             <a:fld id="{807CB568-C05F-482F-9F26-AA302B8892DF}" type="datetimeFigureOut">
               <a:rPr lang="es-ES" smtClean="0"/>
               <a:pPr/>
-              <a:t>22/04/2013</a:t>
+              <a:t>23/04/2013</a:t>
             </a:fld>
             <a:endParaRPr lang="es-ES"/>
           </a:p>
@@ -2976,7 +2976,7 @@
             <a:fld id="{807CB568-C05F-482F-9F26-AA302B8892DF}" type="datetimeFigureOut">
               <a:rPr lang="es-ES" smtClean="0"/>
               <a:pPr/>
-              <a:t>22/04/2013</a:t>
+              <a:t>23/04/2013</a:t>
             </a:fld>
             <a:endParaRPr lang="es-ES"/>
           </a:p>
@@ -3165,7 +3165,7 @@
             <a:fld id="{807CB568-C05F-482F-9F26-AA302B8892DF}" type="datetimeFigureOut">
               <a:rPr lang="es-ES" smtClean="0"/>
               <a:pPr/>
-              <a:t>22/04/2013</a:t>
+              <a:t>23/04/2013</a:t>
             </a:fld>
             <a:endParaRPr lang="es-ES"/>
           </a:p>
@@ -3344,7 +3344,7 @@
             <a:fld id="{807CB568-C05F-482F-9F26-AA302B8892DF}" type="datetimeFigureOut">
               <a:rPr lang="es-ES" smtClean="0"/>
               <a:pPr/>
-              <a:t>22/04/2013</a:t>
+              <a:t>23/04/2013</a:t>
             </a:fld>
             <a:endParaRPr lang="es-ES"/>
           </a:p>
@@ -3599,7 +3599,7 @@
             <a:fld id="{807CB568-C05F-482F-9F26-AA302B8892DF}" type="datetimeFigureOut">
               <a:rPr lang="es-ES" smtClean="0"/>
               <a:pPr/>
-              <a:t>22/04/2013</a:t>
+              <a:t>23/04/2013</a:t>
             </a:fld>
             <a:endParaRPr lang="es-ES"/>
           </a:p>
@@ -3896,7 +3896,7 @@
             <a:fld id="{807CB568-C05F-482F-9F26-AA302B8892DF}" type="datetimeFigureOut">
               <a:rPr lang="es-ES" smtClean="0"/>
               <a:pPr/>
-              <a:t>22/04/2013</a:t>
+              <a:t>23/04/2013</a:t>
             </a:fld>
             <a:endParaRPr lang="es-ES"/>
           </a:p>
@@ -4327,7 +4327,7 @@
             <a:fld id="{807CB568-C05F-482F-9F26-AA302B8892DF}" type="datetimeFigureOut">
               <a:rPr lang="es-ES" smtClean="0"/>
               <a:pPr/>
-              <a:t>22/04/2013</a:t>
+              <a:t>23/04/2013</a:t>
             </a:fld>
             <a:endParaRPr lang="es-ES"/>
           </a:p>
@@ -4454,7 +4454,7 @@
             <a:fld id="{807CB568-C05F-482F-9F26-AA302B8892DF}" type="datetimeFigureOut">
               <a:rPr lang="es-ES" smtClean="0"/>
               <a:pPr/>
-              <a:t>22/04/2013</a:t>
+              <a:t>23/04/2013</a:t>
             </a:fld>
             <a:endParaRPr lang="es-ES"/>
           </a:p>
@@ -4558,7 +4558,7 @@
             <a:fld id="{807CB568-C05F-482F-9F26-AA302B8892DF}" type="datetimeFigureOut">
               <a:rPr lang="es-ES" smtClean="0"/>
               <a:pPr/>
-              <a:t>22/04/2013</a:t>
+              <a:t>23/04/2013</a:t>
             </a:fld>
             <a:endParaRPr lang="es-ES"/>
           </a:p>
@@ -4844,7 +4844,7 @@
             <a:fld id="{807CB568-C05F-482F-9F26-AA302B8892DF}" type="datetimeFigureOut">
               <a:rPr lang="es-ES" smtClean="0"/>
               <a:pPr/>
-              <a:t>22/04/2013</a:t>
+              <a:t>23/04/2013</a:t>
             </a:fld>
             <a:endParaRPr lang="es-ES"/>
           </a:p>
@@ -5113,7 +5113,7 @@
             <a:fld id="{807CB568-C05F-482F-9F26-AA302B8892DF}" type="datetimeFigureOut">
               <a:rPr lang="es-ES" smtClean="0"/>
               <a:pPr/>
-              <a:t>22/04/2013</a:t>
+              <a:t>23/04/2013</a:t>
             </a:fld>
             <a:endParaRPr lang="es-ES"/>
           </a:p>
@@ -5364,7 +5364,7 @@
             <a:fld id="{807CB568-C05F-482F-9F26-AA302B8892DF}" type="datetimeFigureOut">
               <a:rPr lang="es-ES" smtClean="0"/>
               <a:pPr/>
-              <a:t>22/04/2013</a:t>
+              <a:t>23/04/2013</a:t>
             </a:fld>
             <a:endParaRPr lang="es-ES"/>
           </a:p>
@@ -6427,14 +6427,14 @@
             <a:r>
               <a:rPr lang="en-US" sz="11500" b="1" dirty="0" smtClean="0">
                 <a:solidFill>
-                  <a:schemeClr val="tx2"/>
+                  <a:srgbClr val="FF0000"/>
                 </a:solidFill>
               </a:rPr>
               <a:t>Automation</a:t>
             </a:r>
             <a:endParaRPr lang="en-US" sz="7200" b="1" dirty="0">
               <a:solidFill>
-                <a:schemeClr val="tx2"/>
+                <a:srgbClr val="FF0000"/>
               </a:solidFill>
             </a:endParaRPr>
           </a:p>

</xml_diff>

<commit_message>
Maven comentado en ejercicio
</commit_message>
<xml_diff>
--- a/Diapositivas/0. Test Automation.pptx
+++ b/Diapositivas/0. Test Automation.pptx
@@ -116,7 +116,22 @@
       </a:defRPr>
     </a:lvl9pPr>
   </p:defaultTextStyle>
-  <p:extLst/>
+  <p:extLst>
+    <p:ext uri="{EFAFB233-063F-42B5-8137-9DF3F51BA10A}">
+      <p15:sldGuideLst xmlns:p15="http://schemas.microsoft.com/office/powerpoint/2012/main">
+        <p15:guide id="1" orient="horz" pos="2160">
+          <p15:clr>
+            <a:srgbClr val="A4A3A4"/>
+          </p15:clr>
+        </p15:guide>
+        <p15:guide id="2" pos="2880">
+          <p15:clr>
+            <a:srgbClr val="A4A3A4"/>
+          </p15:clr>
+        </p15:guide>
+      </p15:sldGuideLst>
+    </p:ext>
+  </p:extLst>
 </p:presentation>
 </file>
 
@@ -124,15 +139,6 @@
 <p:cmAuthorLst xmlns:a="http://schemas.openxmlformats.org/drawingml/2006/main" xmlns:r="http://schemas.openxmlformats.org/officeDocument/2006/relationships" xmlns:p="http://schemas.openxmlformats.org/presentationml/2006/main">
   <p:cmAuthor id="0" name="Snahider" initials="S" lastIdx="20" clrIdx="0"/>
 </p:cmAuthorLst>
-</file>
-
-<file path=ppt/comments/comment1.xml><?xml version="1.0" encoding="utf-8"?>
-<p:cmLst xmlns:a="http://schemas.openxmlformats.org/drawingml/2006/main" xmlns:r="http://schemas.openxmlformats.org/officeDocument/2006/relationships" xmlns:p="http://schemas.openxmlformats.org/presentationml/2006/main">
-  <p:cm authorId="0" dt="2012-08-22T17:59:56.774" idx="14">
-    <p:pos x="10" y="10"/>
-    <p:text> Organizar mejor esta diapositiva</p:text>
-  </p:cm>
-</p:cmLst>
 </file>
 
 <file path=ppt/notesMasters/notesMaster1.xml><?xml version="1.0" encoding="utf-8"?>
@@ -217,7 +223,7 @@
           <a:p>
             <a:fld id="{63D5FC4C-9EE1-4746-A368-724F618FC790}" type="datetimeFigureOut">
               <a:rPr lang="es-PE" smtClean="0"/>
-              <a:t>23/04/2013</a:t>
+              <a:t>19/12/2013</a:t>
             </a:fld>
             <a:endParaRPr lang="es-PE"/>
           </a:p>
@@ -2797,7 +2803,7 @@
             <a:fld id="{807CB568-C05F-482F-9F26-AA302B8892DF}" type="datetimeFigureOut">
               <a:rPr lang="es-ES" smtClean="0"/>
               <a:pPr/>
-              <a:t>23/04/2013</a:t>
+              <a:t>19/12/2013</a:t>
             </a:fld>
             <a:endParaRPr lang="es-ES"/>
           </a:p>
@@ -2976,7 +2982,7 @@
             <a:fld id="{807CB568-C05F-482F-9F26-AA302B8892DF}" type="datetimeFigureOut">
               <a:rPr lang="es-ES" smtClean="0"/>
               <a:pPr/>
-              <a:t>23/04/2013</a:t>
+              <a:t>19/12/2013</a:t>
             </a:fld>
             <a:endParaRPr lang="es-ES"/>
           </a:p>
@@ -3165,7 +3171,7 @@
             <a:fld id="{807CB568-C05F-482F-9F26-AA302B8892DF}" type="datetimeFigureOut">
               <a:rPr lang="es-ES" smtClean="0"/>
               <a:pPr/>
-              <a:t>23/04/2013</a:t>
+              <a:t>19/12/2013</a:t>
             </a:fld>
             <a:endParaRPr lang="es-ES"/>
           </a:p>
@@ -3344,7 +3350,7 @@
             <a:fld id="{807CB568-C05F-482F-9F26-AA302B8892DF}" type="datetimeFigureOut">
               <a:rPr lang="es-ES" smtClean="0"/>
               <a:pPr/>
-              <a:t>23/04/2013</a:t>
+              <a:t>19/12/2013</a:t>
             </a:fld>
             <a:endParaRPr lang="es-ES"/>
           </a:p>
@@ -3599,7 +3605,7 @@
             <a:fld id="{807CB568-C05F-482F-9F26-AA302B8892DF}" type="datetimeFigureOut">
               <a:rPr lang="es-ES" smtClean="0"/>
               <a:pPr/>
-              <a:t>23/04/2013</a:t>
+              <a:t>19/12/2013</a:t>
             </a:fld>
             <a:endParaRPr lang="es-ES"/>
           </a:p>
@@ -3896,7 +3902,7 @@
             <a:fld id="{807CB568-C05F-482F-9F26-AA302B8892DF}" type="datetimeFigureOut">
               <a:rPr lang="es-ES" smtClean="0"/>
               <a:pPr/>
-              <a:t>23/04/2013</a:t>
+              <a:t>19/12/2013</a:t>
             </a:fld>
             <a:endParaRPr lang="es-ES"/>
           </a:p>
@@ -4327,7 +4333,7 @@
             <a:fld id="{807CB568-C05F-482F-9F26-AA302B8892DF}" type="datetimeFigureOut">
               <a:rPr lang="es-ES" smtClean="0"/>
               <a:pPr/>
-              <a:t>23/04/2013</a:t>
+              <a:t>19/12/2013</a:t>
             </a:fld>
             <a:endParaRPr lang="es-ES"/>
           </a:p>
@@ -4454,7 +4460,7 @@
             <a:fld id="{807CB568-C05F-482F-9F26-AA302B8892DF}" type="datetimeFigureOut">
               <a:rPr lang="es-ES" smtClean="0"/>
               <a:pPr/>
-              <a:t>23/04/2013</a:t>
+              <a:t>19/12/2013</a:t>
             </a:fld>
             <a:endParaRPr lang="es-ES"/>
           </a:p>
@@ -4558,7 +4564,7 @@
             <a:fld id="{807CB568-C05F-482F-9F26-AA302B8892DF}" type="datetimeFigureOut">
               <a:rPr lang="es-ES" smtClean="0"/>
               <a:pPr/>
-              <a:t>23/04/2013</a:t>
+              <a:t>19/12/2013</a:t>
             </a:fld>
             <a:endParaRPr lang="es-ES"/>
           </a:p>
@@ -4844,7 +4850,7 @@
             <a:fld id="{807CB568-C05F-482F-9F26-AA302B8892DF}" type="datetimeFigureOut">
               <a:rPr lang="es-ES" smtClean="0"/>
               <a:pPr/>
-              <a:t>23/04/2013</a:t>
+              <a:t>19/12/2013</a:t>
             </a:fld>
             <a:endParaRPr lang="es-ES"/>
           </a:p>
@@ -5113,7 +5119,7 @@
             <a:fld id="{807CB568-C05F-482F-9F26-AA302B8892DF}" type="datetimeFigureOut">
               <a:rPr lang="es-ES" smtClean="0"/>
               <a:pPr/>
-              <a:t>23/04/2013</a:t>
+              <a:t>19/12/2013</a:t>
             </a:fld>
             <a:endParaRPr lang="es-ES"/>
           </a:p>
@@ -5364,7 +5370,7 @@
             <a:fld id="{807CB568-C05F-482F-9F26-AA302B8892DF}" type="datetimeFigureOut">
               <a:rPr lang="es-ES" smtClean="0"/>
               <a:pPr/>
-              <a:t>23/04/2013</a:t>
+              <a:t>19/12/2013</a:t>
             </a:fld>
             <a:endParaRPr lang="es-ES"/>
           </a:p>

</xml_diff>